<commit_message>
few changes in the slide
few changes in the slide
</commit_message>
<xml_diff>
--- a/Presentation.pptx
+++ b/Presentation.pptx
@@ -113,6 +113,11 @@
       </a:defRPr>
     </a:lvl9pPr>
   </p:defaultTextStyle>
+  <p:extLst>
+    <p:ext uri="{EFAFB233-063F-42B5-8137-9DF3F51BA10A}">
+      <p15:sldGuideLst xmlns:p15="http://schemas.microsoft.com/office/powerpoint/2012/main"/>
+    </p:ext>
+  </p:extLst>
 </p:presentation>
 </file>
 
@@ -198,7 +203,7 @@
           <a:p>
             <a:fld id="{CB9C2D7E-E85F-CF44-A291-506BF9B56C46}" type="datetimeFigureOut">
               <a:rPr lang="en-US" smtClean="0"/>
-              <a:t>1/15/17</a:t>
+              <a:t>1/16/17</a:t>
             </a:fld>
             <a:endParaRPr lang="en-US"/>
           </a:p>
@@ -597,7 +602,7 @@
           <a:p>
             <a:fld id="{81EDFEA6-7C59-5348-9E88-917F126E05FD}" type="datetimeFigureOut">
               <a:rPr lang="en-US" smtClean="0"/>
-              <a:t>1/15/17</a:t>
+              <a:t>1/16/17</a:t>
             </a:fld>
             <a:endParaRPr lang="en-US"/>
           </a:p>
@@ -767,7 +772,7 @@
           <a:p>
             <a:fld id="{81EDFEA6-7C59-5348-9E88-917F126E05FD}" type="datetimeFigureOut">
               <a:rPr lang="en-US" smtClean="0"/>
-              <a:t>1/15/17</a:t>
+              <a:t>1/16/17</a:t>
             </a:fld>
             <a:endParaRPr lang="en-US"/>
           </a:p>
@@ -947,7 +952,7 @@
           <a:p>
             <a:fld id="{81EDFEA6-7C59-5348-9E88-917F126E05FD}" type="datetimeFigureOut">
               <a:rPr lang="en-US" smtClean="0"/>
-              <a:t>1/15/17</a:t>
+              <a:t>1/16/17</a:t>
             </a:fld>
             <a:endParaRPr lang="en-US"/>
           </a:p>
@@ -1117,7 +1122,7 @@
           <a:p>
             <a:fld id="{81EDFEA6-7C59-5348-9E88-917F126E05FD}" type="datetimeFigureOut">
               <a:rPr lang="en-US" smtClean="0"/>
-              <a:t>1/15/17</a:t>
+              <a:t>1/16/17</a:t>
             </a:fld>
             <a:endParaRPr lang="en-US"/>
           </a:p>
@@ -1363,7 +1368,7 @@
           <a:p>
             <a:fld id="{81EDFEA6-7C59-5348-9E88-917F126E05FD}" type="datetimeFigureOut">
               <a:rPr lang="en-US" smtClean="0"/>
-              <a:t>1/15/17</a:t>
+              <a:t>1/16/17</a:t>
             </a:fld>
             <a:endParaRPr lang="en-US"/>
           </a:p>
@@ -1595,7 +1600,7 @@
           <a:p>
             <a:fld id="{81EDFEA6-7C59-5348-9E88-917F126E05FD}" type="datetimeFigureOut">
               <a:rPr lang="en-US" smtClean="0"/>
-              <a:t>1/15/17</a:t>
+              <a:t>1/16/17</a:t>
             </a:fld>
             <a:endParaRPr lang="en-US"/>
           </a:p>
@@ -1962,7 +1967,7 @@
           <a:p>
             <a:fld id="{81EDFEA6-7C59-5348-9E88-917F126E05FD}" type="datetimeFigureOut">
               <a:rPr lang="en-US" smtClean="0"/>
-              <a:t>1/15/17</a:t>
+              <a:t>1/16/17</a:t>
             </a:fld>
             <a:endParaRPr lang="en-US"/>
           </a:p>
@@ -2080,7 +2085,7 @@
           <a:p>
             <a:fld id="{81EDFEA6-7C59-5348-9E88-917F126E05FD}" type="datetimeFigureOut">
               <a:rPr lang="en-US" smtClean="0"/>
-              <a:t>1/15/17</a:t>
+              <a:t>1/16/17</a:t>
             </a:fld>
             <a:endParaRPr lang="en-US"/>
           </a:p>
@@ -2175,7 +2180,7 @@
           <a:p>
             <a:fld id="{81EDFEA6-7C59-5348-9E88-917F126E05FD}" type="datetimeFigureOut">
               <a:rPr lang="en-US" smtClean="0"/>
-              <a:t>1/15/17</a:t>
+              <a:t>1/16/17</a:t>
             </a:fld>
             <a:endParaRPr lang="en-US"/>
           </a:p>
@@ -2452,7 +2457,7 @@
           <a:p>
             <a:fld id="{81EDFEA6-7C59-5348-9E88-917F126E05FD}" type="datetimeFigureOut">
               <a:rPr lang="en-US" smtClean="0"/>
-              <a:t>1/15/17</a:t>
+              <a:t>1/16/17</a:t>
             </a:fld>
             <a:endParaRPr lang="en-US"/>
           </a:p>
@@ -2705,7 +2710,7 @@
           <a:p>
             <a:fld id="{81EDFEA6-7C59-5348-9E88-917F126E05FD}" type="datetimeFigureOut">
               <a:rPr lang="en-US" smtClean="0"/>
-              <a:t>1/15/17</a:t>
+              <a:t>1/16/17</a:t>
             </a:fld>
             <a:endParaRPr lang="en-US"/>
           </a:p>
@@ -2918,7 +2923,7 @@
           <a:p>
             <a:fld id="{81EDFEA6-7C59-5348-9E88-917F126E05FD}" type="datetimeFigureOut">
               <a:rPr lang="en-US" smtClean="0"/>
-              <a:t>1/15/17</a:t>
+              <a:t>1/16/17</a:t>
             </a:fld>
             <a:endParaRPr lang="en-US"/>
           </a:p>
@@ -3423,7 +3428,7 @@
           <a:p>
             <a:r>
               <a:rPr lang="en-US" dirty="0" smtClean="0"/>
-              <a:t>AR part </a:t>
+              <a:t>Auto-regression (AR) </a:t>
             </a:r>
             <a:r>
               <a:rPr lang="mr-IN" dirty="0" smtClean="0"/>
@@ -3475,7 +3480,7 @@
           <a:p>
             <a:r>
               <a:rPr lang="en-US" dirty="0" smtClean="0"/>
-              <a:t>MA -</a:t>
+              <a:t>Moving Average (MA) -</a:t>
             </a:r>
           </a:p>
           <a:p>
@@ -3484,7 +3489,7 @@
             </a:pPr>
             <a:r>
               <a:rPr lang="en-US" dirty="0" smtClean="0"/>
-              <a:t>Shocks are measured by moving average of the model.</a:t>
+              <a:t>Market shocks are measured by moving average of the model.</a:t>
             </a:r>
           </a:p>
         </p:txBody>

</xml_diff>